<commit_message>
poster + pitch 4K
</commit_message>
<xml_diff>
--- a/Miscellaneous/pitch challenge/pitch.pptx
+++ b/Miscellaneous/pitch challenge/pitch.pptx
@@ -104,6 +104,11 @@
       </a:defRPr>
     </a:lvl9pPr>
   </p:defaultTextStyle>
+  <p:extLst>
+    <p:ext uri="{EFAFB233-063F-42B5-8137-9DF3F51BA10A}">
+      <p15:sldGuideLst xmlns:p15="http://schemas.microsoft.com/office/powerpoint/2012/main"/>
+    </p:ext>
+  </p:extLst>
 </p:presentation>
 </file>
 
@@ -256,7 +261,7 @@
           <a:p>
             <a:fld id="{E4E1B720-B5BE-477A-8AA5-AC3550A147F3}" type="datetimeFigureOut">
               <a:rPr lang="fr-CH" smtClean="0"/>
-              <a:t>17.08.2023</a:t>
+              <a:t>19.08.2023</a:t>
             </a:fld>
             <a:endParaRPr lang="fr-CH"/>
           </a:p>
@@ -456,7 +461,7 @@
           <a:p>
             <a:fld id="{E4E1B720-B5BE-477A-8AA5-AC3550A147F3}" type="datetimeFigureOut">
               <a:rPr lang="fr-CH" smtClean="0"/>
-              <a:t>17.08.2023</a:t>
+              <a:t>19.08.2023</a:t>
             </a:fld>
             <a:endParaRPr lang="fr-CH"/>
           </a:p>
@@ -666,7 +671,7 @@
           <a:p>
             <a:fld id="{E4E1B720-B5BE-477A-8AA5-AC3550A147F3}" type="datetimeFigureOut">
               <a:rPr lang="fr-CH" smtClean="0"/>
-              <a:t>17.08.2023</a:t>
+              <a:t>19.08.2023</a:t>
             </a:fld>
             <a:endParaRPr lang="fr-CH"/>
           </a:p>
@@ -866,7 +871,7 @@
           <a:p>
             <a:fld id="{E4E1B720-B5BE-477A-8AA5-AC3550A147F3}" type="datetimeFigureOut">
               <a:rPr lang="fr-CH" smtClean="0"/>
-              <a:t>17.08.2023</a:t>
+              <a:t>19.08.2023</a:t>
             </a:fld>
             <a:endParaRPr lang="fr-CH"/>
           </a:p>
@@ -1142,7 +1147,7 @@
           <a:p>
             <a:fld id="{E4E1B720-B5BE-477A-8AA5-AC3550A147F3}" type="datetimeFigureOut">
               <a:rPr lang="fr-CH" smtClean="0"/>
-              <a:t>17.08.2023</a:t>
+              <a:t>19.08.2023</a:t>
             </a:fld>
             <a:endParaRPr lang="fr-CH"/>
           </a:p>
@@ -1410,7 +1415,7 @@
           <a:p>
             <a:fld id="{E4E1B720-B5BE-477A-8AA5-AC3550A147F3}" type="datetimeFigureOut">
               <a:rPr lang="fr-CH" smtClean="0"/>
-              <a:t>17.08.2023</a:t>
+              <a:t>19.08.2023</a:t>
             </a:fld>
             <a:endParaRPr lang="fr-CH"/>
           </a:p>
@@ -1825,7 +1830,7 @@
           <a:p>
             <a:fld id="{E4E1B720-B5BE-477A-8AA5-AC3550A147F3}" type="datetimeFigureOut">
               <a:rPr lang="fr-CH" smtClean="0"/>
-              <a:t>17.08.2023</a:t>
+              <a:t>19.08.2023</a:t>
             </a:fld>
             <a:endParaRPr lang="fr-CH"/>
           </a:p>
@@ -1967,7 +1972,7 @@
           <a:p>
             <a:fld id="{E4E1B720-B5BE-477A-8AA5-AC3550A147F3}" type="datetimeFigureOut">
               <a:rPr lang="fr-CH" smtClean="0"/>
-              <a:t>17.08.2023</a:t>
+              <a:t>19.08.2023</a:t>
             </a:fld>
             <a:endParaRPr lang="fr-CH"/>
           </a:p>
@@ -2080,7 +2085,7 @@
           <a:p>
             <a:fld id="{E4E1B720-B5BE-477A-8AA5-AC3550A147F3}" type="datetimeFigureOut">
               <a:rPr lang="fr-CH" smtClean="0"/>
-              <a:t>17.08.2023</a:t>
+              <a:t>19.08.2023</a:t>
             </a:fld>
             <a:endParaRPr lang="fr-CH"/>
           </a:p>
@@ -2393,7 +2398,7 @@
           <a:p>
             <a:fld id="{E4E1B720-B5BE-477A-8AA5-AC3550A147F3}" type="datetimeFigureOut">
               <a:rPr lang="fr-CH" smtClean="0"/>
-              <a:t>17.08.2023</a:t>
+              <a:t>19.08.2023</a:t>
             </a:fld>
             <a:endParaRPr lang="fr-CH"/>
           </a:p>
@@ -2682,7 +2687,7 @@
           <a:p>
             <a:fld id="{E4E1B720-B5BE-477A-8AA5-AC3550A147F3}" type="datetimeFigureOut">
               <a:rPr lang="fr-CH" smtClean="0"/>
-              <a:t>17.08.2023</a:t>
+              <a:t>19.08.2023</a:t>
             </a:fld>
             <a:endParaRPr lang="fr-CH"/>
           </a:p>
@@ -2925,7 +2930,7 @@
           <a:p>
             <a:fld id="{E4E1B720-B5BE-477A-8AA5-AC3550A147F3}" type="datetimeFigureOut">
               <a:rPr lang="fr-CH" smtClean="0"/>
-              <a:t>17.08.2023</a:t>
+              <a:t>19.08.2023</a:t>
             </a:fld>
             <a:endParaRPr lang="fr-CH"/>
           </a:p>
@@ -3344,10 +3349,10 @@
       </p:grpSpPr>
       <p:pic>
         <p:nvPicPr>
-          <p:cNvPr id="5" name="Image 4">
-            <a:extLst>
-              <a:ext uri="{FF2B5EF4-FFF2-40B4-BE49-F238E27FC236}">
-                <a16:creationId xmlns:a16="http://schemas.microsoft.com/office/drawing/2014/main" id="{99AFAFA2-1BAD-003D-93A0-930F338C63BF}"/>
+          <p:cNvPr id="3" name="Image 2">
+            <a:extLst>
+              <a:ext uri="{FF2B5EF4-FFF2-40B4-BE49-F238E27FC236}">
+                <a16:creationId xmlns:a16="http://schemas.microsoft.com/office/drawing/2014/main" id="{B4AE8F90-FF48-D05C-0CBA-F0529CB7DEA9}"/>
               </a:ext>
             </a:extLst>
           </p:cNvPr>

</xml_diff>